<commit_message>
Update slide on retrospective
</commit_message>
<xml_diff>
--- a/docs/Presentation/milestone3_presentation.pptx
+++ b/docs/Presentation/milestone3_presentation.pptx
@@ -289,7 +289,7 @@
             <a:fld id="{87DE6118-2437-4B30-8E3C-4D2BE6020583}" type="datetimeFigureOut">
               <a:rPr lang="en-US" dirty="0"/>
               <a:pPr/>
-              <a:t>10/14/2020</a:t>
+              <a:t>10/14/20</a:t>
             </a:fld>
             <a:endParaRPr lang="en-US" dirty="0"/>
           </a:p>
@@ -615,7 +615,7 @@
           <a:p>
             <a:fld id="{87DE6118-2437-4B30-8E3C-4D2BE6020583}" type="datetimeFigureOut">
               <a:rPr lang="en-US" dirty="0"/>
-              <a:t>10/14/2020</a:t>
+              <a:t>10/14/20</a:t>
             </a:fld>
             <a:endParaRPr lang="en-US" dirty="0"/>
           </a:p>
@@ -790,7 +790,7 @@
           <a:p>
             <a:fld id="{87DE6118-2437-4B30-8E3C-4D2BE6020583}" type="datetimeFigureOut">
               <a:rPr lang="en-US" dirty="0"/>
-              <a:t>10/14/2020</a:t>
+              <a:t>10/14/20</a:t>
             </a:fld>
             <a:endParaRPr lang="en-US" dirty="0"/>
           </a:p>
@@ -955,7 +955,7 @@
           <a:p>
             <a:fld id="{87DE6118-2437-4B30-8E3C-4D2BE6020583}" type="datetimeFigureOut">
               <a:rPr lang="en-US" dirty="0"/>
-              <a:t>10/14/2020</a:t>
+              <a:t>10/14/20</a:t>
             </a:fld>
             <a:endParaRPr lang="en-US" dirty="0"/>
           </a:p>
@@ -1228,7 +1228,7 @@
             <a:fld id="{87DE6118-2437-4B30-8E3C-4D2BE6020583}" type="datetimeFigureOut">
               <a:rPr lang="en-US" dirty="0"/>
               <a:pPr/>
-              <a:t>10/14/2020</a:t>
+              <a:t>10/14/20</a:t>
             </a:fld>
             <a:endParaRPr lang="en-US" dirty="0"/>
           </a:p>
@@ -1618,7 +1618,7 @@
           <a:p>
             <a:fld id="{87DE6118-2437-4B30-8E3C-4D2BE6020583}" type="datetimeFigureOut">
               <a:rPr lang="en-US" dirty="0"/>
-              <a:t>10/14/2020</a:t>
+              <a:t>10/14/20</a:t>
             </a:fld>
             <a:endParaRPr lang="en-US" dirty="0"/>
           </a:p>
@@ -2090,7 +2090,7 @@
           <a:p>
             <a:fld id="{87DE6118-2437-4B30-8E3C-4D2BE6020583}" type="datetimeFigureOut">
               <a:rPr lang="en-US" dirty="0"/>
-              <a:t>10/14/2020</a:t>
+              <a:t>10/14/20</a:t>
             </a:fld>
             <a:endParaRPr lang="en-US" dirty="0"/>
           </a:p>
@@ -2203,7 +2203,7 @@
           <a:p>
             <a:fld id="{87DE6118-2437-4B30-8E3C-4D2BE6020583}" type="datetimeFigureOut">
               <a:rPr lang="en-US" dirty="0"/>
-              <a:t>10/14/2020</a:t>
+              <a:t>10/14/20</a:t>
             </a:fld>
             <a:endParaRPr lang="en-US" dirty="0"/>
           </a:p>
@@ -2293,7 +2293,7 @@
           <a:p>
             <a:fld id="{87DE6118-2437-4B30-8E3C-4D2BE6020583}" type="datetimeFigureOut">
               <a:rPr lang="en-US" dirty="0"/>
-              <a:t>10/14/2020</a:t>
+              <a:t>10/14/20</a:t>
             </a:fld>
             <a:endParaRPr lang="en-US" dirty="0"/>
           </a:p>
@@ -2635,7 +2635,7 @@
             <a:fld id="{87DE6118-2437-4B30-8E3C-4D2BE6020583}" type="datetimeFigureOut">
               <a:rPr lang="en-US" dirty="0"/>
               <a:pPr/>
-              <a:t>10/14/2020</a:t>
+              <a:t>10/14/20</a:t>
             </a:fld>
             <a:endParaRPr lang="en-US" dirty="0"/>
           </a:p>
@@ -3020,7 +3020,7 @@
             <a:fld id="{87DE6118-2437-4B30-8E3C-4D2BE6020583}" type="datetimeFigureOut">
               <a:rPr lang="en-US" dirty="0"/>
               <a:pPr/>
-              <a:t>10/14/2020</a:t>
+              <a:t>10/14/20</a:t>
             </a:fld>
             <a:endParaRPr lang="en-US" dirty="0"/>
           </a:p>
@@ -3295,7 +3295,7 @@
             <a:fld id="{87DE6118-2437-4B30-8E3C-4D2BE6020583}" type="datetimeFigureOut">
               <a:rPr lang="en-US" dirty="0"/>
               <a:pPr/>
-              <a:t>10/14/2020</a:t>
+              <a:t>10/14/20</a:t>
             </a:fld>
             <a:endParaRPr lang="en-US" dirty="0"/>
           </a:p>
@@ -5289,11 +5289,13 @@
         <p:spPr>
           <a:xfrm>
             <a:off x="1371600" y="1885949"/>
-            <a:ext cx="4724400" cy="4286251"/>
-          </a:xfrm>
-        </p:spPr>
-        <p:txBody>
-          <a:bodyPr/>
+            <a:ext cx="4724400" cy="4778087"/>
+          </a:xfrm>
+        </p:spPr>
+        <p:txBody>
+          <a:bodyPr>
+            <a:normAutofit lnSpcReduction="10000"/>
+          </a:bodyPr>
           <a:lstStyle/>
           <a:p>
             <a:r>
@@ -5312,29 +5314,86 @@
             </a:r>
           </a:p>
           <a:p>
-            <a:endParaRPr lang="en-US" dirty="0"/>
-          </a:p>
-          <a:p>
-            <a:endParaRPr lang="en-US" dirty="0"/>
-          </a:p>
-          <a:p>
-            <a:endParaRPr lang="en-US" dirty="0"/>
-          </a:p>
-          <a:p>
-            <a:r>
-              <a:rPr lang="en-US" sz="2400" dirty="0"/>
-              <a:t>What could be improved?</a:t>
-            </a:r>
-          </a:p>
-          <a:p>
             <a:pPr>
               <a:buFont typeface="Courier New" panose="02070309020205020404" pitchFamily="49" charset="0"/>
               <a:buChar char="o"/>
             </a:pPr>
             <a:r>
               <a:rPr lang="en-US" dirty="0"/>
+              <a:t>Sprints based development process</a:t>
+            </a:r>
+          </a:p>
+          <a:p>
+            <a:pPr>
+              <a:buFont typeface="Courier New" panose="02070309020205020404" pitchFamily="49" charset="0"/>
+              <a:buChar char="o"/>
+            </a:pPr>
+            <a:r>
+              <a:rPr lang="en-US" dirty="0"/>
+              <a:t>Independent coding task</a:t>
+            </a:r>
+          </a:p>
+          <a:p>
+            <a:endParaRPr lang="en-US" dirty="0"/>
+          </a:p>
+          <a:p>
+            <a:pPr marL="0" indent="0">
+              <a:buNone/>
+            </a:pPr>
+            <a:endParaRPr lang="en-US" dirty="0"/>
+          </a:p>
+          <a:p>
+            <a:r>
+              <a:rPr lang="en-US" sz="2400" dirty="0"/>
+              <a:t>What could be improved?</a:t>
+            </a:r>
+          </a:p>
+          <a:p>
+            <a:pPr>
+              <a:buFont typeface="Courier New" panose="02070309020205020404" pitchFamily="49" charset="0"/>
+              <a:buChar char="o"/>
+            </a:pPr>
+            <a:r>
+              <a:rPr lang="en-US" dirty="0"/>
               <a:t>More involvement in CI/CD</a:t>
             </a:r>
+          </a:p>
+          <a:p>
+            <a:pPr>
+              <a:buFont typeface="Courier New" panose="02070309020205020404" pitchFamily="49" charset="0"/>
+              <a:buChar char="o"/>
+            </a:pPr>
+            <a:r>
+              <a:rPr lang="en-US" dirty="0"/>
+              <a:t>Unit testing</a:t>
+            </a:r>
+          </a:p>
+          <a:p>
+            <a:pPr>
+              <a:buFont typeface="Courier New" panose="02070309020205020404" pitchFamily="49" charset="0"/>
+              <a:buChar char="o"/>
+            </a:pPr>
+            <a:r>
+              <a:rPr lang="en-US" dirty="0"/>
+              <a:t>Higher code quality</a:t>
+            </a:r>
+          </a:p>
+          <a:p>
+            <a:pPr>
+              <a:buFont typeface="Courier New" panose="02070309020205020404" pitchFamily="49" charset="0"/>
+              <a:buChar char="o"/>
+            </a:pPr>
+            <a:r>
+              <a:rPr lang="en-US" dirty="0"/>
+              <a:t>Implementation discussion</a:t>
+            </a:r>
+          </a:p>
+          <a:p>
+            <a:pPr>
+              <a:buFont typeface="Courier New" panose="02070309020205020404" pitchFamily="49" charset="0"/>
+              <a:buChar char="o"/>
+            </a:pPr>
+            <a:endParaRPr lang="en-US" dirty="0"/>
           </a:p>
         </p:txBody>
       </p:sp>
@@ -5361,7 +5420,9 @@
           </a:xfrm>
         </p:spPr>
         <p:txBody>
-          <a:bodyPr/>
+          <a:bodyPr>
+            <a:normAutofit lnSpcReduction="10000"/>
+          </a:bodyPr>
           <a:lstStyle/>
           <a:p>
             <a:r>
@@ -5390,28 +5451,58 @@
             </a:r>
           </a:p>
           <a:p>
-            <a:endParaRPr lang="en-US" dirty="0"/>
-          </a:p>
-          <a:p>
-            <a:pPr marL="0" indent="0">
-              <a:buNone/>
-            </a:pPr>
-            <a:endParaRPr lang="en-US" dirty="0"/>
-          </a:p>
-          <a:p>
-            <a:r>
-              <a:rPr lang="en-US" sz="2400" dirty="0"/>
-              <a:t>What did you learn?</a:t>
-            </a:r>
-          </a:p>
-          <a:p>
             <a:pPr>
               <a:buFont typeface="Courier New" panose="02070309020205020404" pitchFamily="49" charset="0"/>
               <a:buChar char="o"/>
             </a:pPr>
             <a:r>
               <a:rPr lang="en-US" dirty="0"/>
+              <a:t>The amount to learn</a:t>
+            </a:r>
+          </a:p>
+          <a:p>
+            <a:endParaRPr lang="en-US" dirty="0"/>
+          </a:p>
+          <a:p>
+            <a:pPr marL="0" indent="0">
+              <a:buNone/>
+            </a:pPr>
+            <a:endParaRPr lang="en-US" dirty="0"/>
+          </a:p>
+          <a:p>
+            <a:r>
+              <a:rPr lang="en-US" sz="2400" dirty="0"/>
+              <a:t>What did you learn?</a:t>
+            </a:r>
+          </a:p>
+          <a:p>
+            <a:pPr>
+              <a:buFont typeface="Courier New" panose="02070309020205020404" pitchFamily="49" charset="0"/>
+              <a:buChar char="o"/>
+            </a:pPr>
+            <a:r>
+              <a:rPr lang="en-US" dirty="0"/>
               <a:t>New platforms and tools</a:t>
+            </a:r>
+          </a:p>
+          <a:p>
+            <a:pPr>
+              <a:buFont typeface="Courier New" panose="02070309020205020404" pitchFamily="49" charset="0"/>
+              <a:buChar char="o"/>
+            </a:pPr>
+            <a:r>
+              <a:rPr lang="en-US" dirty="0"/>
+              <a:t>Scrum</a:t>
+            </a:r>
+          </a:p>
+          <a:p>
+            <a:pPr>
+              <a:buFont typeface="Courier New" panose="02070309020205020404" pitchFamily="49" charset="0"/>
+              <a:buChar char="o"/>
+            </a:pPr>
+            <a:r>
+              <a:rPr lang="en-US" dirty="0"/>
+              <a:t>AWS</a:t>
             </a:r>
           </a:p>
           <a:p>

</xml_diff>